<commit_message>
Fixed powerpoint and readme'
</commit_message>
<xml_diff>
--- a/ME 5 Presentation.pptx
+++ b/ME 5 Presentation.pptx
@@ -4530,6 +4530,219 @@
           </a:graphicData>
         </a:graphic>
       </p:graphicFrame>
+      <p:sp>
+        <p:nvSpPr>
+          <p:cNvPr id="6" name="Content Placeholder 2">
+            <a:extLst>
+              <a:ext uri="{FF2B5EF4-FFF2-40B4-BE49-F238E27FC236}">
+                <a16:creationId xmlns:a16="http://schemas.microsoft.com/office/drawing/2014/main" id="{85EF18FF-5D4A-F99D-62CA-B20E8ED86BEE}"/>
+              </a:ext>
+            </a:extLst>
+          </p:cNvPr>
+          <p:cNvSpPr txBox="1">
+            <a:spLocks/>
+          </p:cNvSpPr>
+          <p:nvPr/>
+        </p:nvSpPr>
+        <p:spPr>
+          <a:xfrm>
+            <a:off x="491350" y="4241587"/>
+            <a:ext cx="6000890" cy="1951980"/>
+          </a:xfrm>
+          <a:prstGeom prst="rect">
+            <a:avLst/>
+          </a:prstGeom>
+        </p:spPr>
+        <p:txBody>
+          <a:bodyPr vert="horz" lIns="91440" tIns="45720" rIns="91440" bIns="45720" rtlCol="0">
+            <a:normAutofit/>
+          </a:bodyPr>
+          <a:lstStyle>
+            <a:lvl1pPr marL="228600" indent="-228600" algn="l" defTabSz="914400" rtl="0" eaLnBrk="1" latinLnBrk="0" hangingPunct="1">
+              <a:lnSpc>
+                <a:spcPct val="90000"/>
+              </a:lnSpc>
+              <a:spcBef>
+                <a:spcPts val="1000"/>
+              </a:spcBef>
+              <a:buFont typeface="Arial" panose="020B0604020202020204" pitchFamily="34" charset="0"/>
+              <a:buChar char="•"/>
+              <a:defRPr sz="2800" kern="1200">
+                <a:solidFill>
+                  <a:schemeClr val="tx1"/>
+                </a:solidFill>
+                <a:latin typeface="+mn-lt"/>
+                <a:ea typeface="+mn-ea"/>
+                <a:cs typeface="+mn-cs"/>
+              </a:defRPr>
+            </a:lvl1pPr>
+            <a:lvl2pPr marL="685800" indent="-228600" algn="l" defTabSz="914400" rtl="0" eaLnBrk="1" latinLnBrk="0" hangingPunct="1">
+              <a:lnSpc>
+                <a:spcPct val="90000"/>
+              </a:lnSpc>
+              <a:spcBef>
+                <a:spcPts val="500"/>
+              </a:spcBef>
+              <a:buFont typeface="Arial" panose="020B0604020202020204" pitchFamily="34" charset="0"/>
+              <a:buChar char="•"/>
+              <a:defRPr sz="2400" kern="1200">
+                <a:solidFill>
+                  <a:schemeClr val="tx1"/>
+                </a:solidFill>
+                <a:latin typeface="+mn-lt"/>
+                <a:ea typeface="+mn-ea"/>
+                <a:cs typeface="+mn-cs"/>
+              </a:defRPr>
+            </a:lvl2pPr>
+            <a:lvl3pPr marL="1143000" indent="-228600" algn="l" defTabSz="914400" rtl="0" eaLnBrk="1" latinLnBrk="0" hangingPunct="1">
+              <a:lnSpc>
+                <a:spcPct val="90000"/>
+              </a:lnSpc>
+              <a:spcBef>
+                <a:spcPts val="500"/>
+              </a:spcBef>
+              <a:buFont typeface="Arial" panose="020B0604020202020204" pitchFamily="34" charset="0"/>
+              <a:buChar char="•"/>
+              <a:defRPr sz="2000" kern="1200">
+                <a:solidFill>
+                  <a:schemeClr val="tx1"/>
+                </a:solidFill>
+                <a:latin typeface="+mn-lt"/>
+                <a:ea typeface="+mn-ea"/>
+                <a:cs typeface="+mn-cs"/>
+              </a:defRPr>
+            </a:lvl3pPr>
+            <a:lvl4pPr marL="1600200" indent="-228600" algn="l" defTabSz="914400" rtl="0" eaLnBrk="1" latinLnBrk="0" hangingPunct="1">
+              <a:lnSpc>
+                <a:spcPct val="90000"/>
+              </a:lnSpc>
+              <a:spcBef>
+                <a:spcPts val="500"/>
+              </a:spcBef>
+              <a:buFont typeface="Arial" panose="020B0604020202020204" pitchFamily="34" charset="0"/>
+              <a:buChar char="•"/>
+              <a:defRPr sz="1800" kern="1200">
+                <a:solidFill>
+                  <a:schemeClr val="tx1"/>
+                </a:solidFill>
+                <a:latin typeface="+mn-lt"/>
+                <a:ea typeface="+mn-ea"/>
+                <a:cs typeface="+mn-cs"/>
+              </a:defRPr>
+            </a:lvl4pPr>
+            <a:lvl5pPr marL="2057400" indent="-228600" algn="l" defTabSz="914400" rtl="0" eaLnBrk="1" latinLnBrk="0" hangingPunct="1">
+              <a:lnSpc>
+                <a:spcPct val="90000"/>
+              </a:lnSpc>
+              <a:spcBef>
+                <a:spcPts val="500"/>
+              </a:spcBef>
+              <a:buFont typeface="Arial" panose="020B0604020202020204" pitchFamily="34" charset="0"/>
+              <a:buChar char="•"/>
+              <a:defRPr sz="1800" kern="1200">
+                <a:solidFill>
+                  <a:schemeClr val="tx1"/>
+                </a:solidFill>
+                <a:latin typeface="+mn-lt"/>
+                <a:ea typeface="+mn-ea"/>
+                <a:cs typeface="+mn-cs"/>
+              </a:defRPr>
+            </a:lvl5pPr>
+            <a:lvl6pPr marL="2514600" indent="-228600" algn="l" defTabSz="914400" rtl="0" eaLnBrk="1" latinLnBrk="0" hangingPunct="1">
+              <a:lnSpc>
+                <a:spcPct val="90000"/>
+              </a:lnSpc>
+              <a:spcBef>
+                <a:spcPts val="500"/>
+              </a:spcBef>
+              <a:buFont typeface="Arial" panose="020B0604020202020204" pitchFamily="34" charset="0"/>
+              <a:buChar char="•"/>
+              <a:defRPr sz="1800" kern="1200">
+                <a:solidFill>
+                  <a:schemeClr val="tx1"/>
+                </a:solidFill>
+                <a:latin typeface="+mn-lt"/>
+                <a:ea typeface="+mn-ea"/>
+                <a:cs typeface="+mn-cs"/>
+              </a:defRPr>
+            </a:lvl6pPr>
+            <a:lvl7pPr marL="2971800" indent="-228600" algn="l" defTabSz="914400" rtl="0" eaLnBrk="1" latinLnBrk="0" hangingPunct="1">
+              <a:lnSpc>
+                <a:spcPct val="90000"/>
+              </a:lnSpc>
+              <a:spcBef>
+                <a:spcPts val="500"/>
+              </a:spcBef>
+              <a:buFont typeface="Arial" panose="020B0604020202020204" pitchFamily="34" charset="0"/>
+              <a:buChar char="•"/>
+              <a:defRPr sz="1800" kern="1200">
+                <a:solidFill>
+                  <a:schemeClr val="tx1"/>
+                </a:solidFill>
+                <a:latin typeface="+mn-lt"/>
+                <a:ea typeface="+mn-ea"/>
+                <a:cs typeface="+mn-cs"/>
+              </a:defRPr>
+            </a:lvl7pPr>
+            <a:lvl8pPr marL="3429000" indent="-228600" algn="l" defTabSz="914400" rtl="0" eaLnBrk="1" latinLnBrk="0" hangingPunct="1">
+              <a:lnSpc>
+                <a:spcPct val="90000"/>
+              </a:lnSpc>
+              <a:spcBef>
+                <a:spcPts val="500"/>
+              </a:spcBef>
+              <a:buFont typeface="Arial" panose="020B0604020202020204" pitchFamily="34" charset="0"/>
+              <a:buChar char="•"/>
+              <a:defRPr sz="1800" kern="1200">
+                <a:solidFill>
+                  <a:schemeClr val="tx1"/>
+                </a:solidFill>
+                <a:latin typeface="+mn-lt"/>
+                <a:ea typeface="+mn-ea"/>
+                <a:cs typeface="+mn-cs"/>
+              </a:defRPr>
+            </a:lvl8pPr>
+            <a:lvl9pPr marL="3886200" indent="-228600" algn="l" defTabSz="914400" rtl="0" eaLnBrk="1" latinLnBrk="0" hangingPunct="1">
+              <a:lnSpc>
+                <a:spcPct val="90000"/>
+              </a:lnSpc>
+              <a:spcBef>
+                <a:spcPts val="500"/>
+              </a:spcBef>
+              <a:buFont typeface="Arial" panose="020B0604020202020204" pitchFamily="34" charset="0"/>
+              <a:buChar char="•"/>
+              <a:defRPr sz="1800" kern="1200">
+                <a:solidFill>
+                  <a:schemeClr val="tx1"/>
+                </a:solidFill>
+                <a:latin typeface="+mn-lt"/>
+                <a:ea typeface="+mn-ea"/>
+                <a:cs typeface="+mn-cs"/>
+              </a:defRPr>
+            </a:lvl9pPr>
+          </a:lstStyle>
+          <a:p>
+            <a:r>
+              <a:rPr lang="en-PH" sz="2200" dirty="0"/>
+              <a:t>High precision and recall (precision is higher)</a:t>
+            </a:r>
+          </a:p>
+          <a:p>
+            <a:r>
+              <a:rPr lang="en-PH" sz="2200" dirty="0"/>
+              <a:t>“Mosaic” used in training until 400</a:t>
+            </a:r>
+            <a:r>
+              <a:rPr lang="en-PH" sz="2200" baseline="30000" dirty="0"/>
+              <a:t>th</a:t>
+            </a:r>
+            <a:r>
+              <a:rPr lang="en-PH" sz="2200" dirty="0"/>
+              <a:t> epoch, explaining decrease in segmentation loss</a:t>
+            </a:r>
+          </a:p>
+        </p:txBody>
+      </p:sp>
     </p:spTree>
     <p:extLst>
       <p:ext uri="{BB962C8B-B14F-4D97-AF65-F5344CB8AC3E}">
@@ -4546,6 +4759,14 @@
 <file path=ppt/slides/slide3.xml><?xml version="1.0" encoding="utf-8"?>
 <p:sld xmlns:a="http://schemas.openxmlformats.org/drawingml/2006/main" xmlns:r="http://schemas.openxmlformats.org/officeDocument/2006/relationships" xmlns:p="http://schemas.openxmlformats.org/presentationml/2006/main">
   <p:cSld>
+    <p:bg>
+      <p:bgPr>
+        <a:solidFill>
+          <a:schemeClr val="bg1"/>
+        </a:solidFill>
+        <a:effectLst/>
+      </p:bgPr>
+    </p:bg>
     <p:spTree>
       <p:nvGrpSpPr>
         <p:cNvPr id="1" name=""/>
@@ -4560,6 +4781,66 @@
           <a:chExt cx="0" cy="0"/>
         </a:xfrm>
       </p:grpSpPr>
+      <p:sp useBgFill="1">
+        <p:nvSpPr>
+          <p:cNvPr id="10" name="Rectangle 9">
+            <a:extLst>
+              <a:ext uri="{FF2B5EF4-FFF2-40B4-BE49-F238E27FC236}">
+                <a16:creationId xmlns:a16="http://schemas.microsoft.com/office/drawing/2014/main" id="{2B97F24A-32CE-4C1C-A50D-3016B394DCFB}"/>
+              </a:ext>
+              <a:ext uri="{C183D7F6-B498-43B3-948B-1728B52AA6E4}">
+                <adec:decorative xmlns:adec="http://schemas.microsoft.com/office/drawing/2017/decorative" val="1"/>
+              </a:ext>
+            </a:extLst>
+          </p:cNvPr>
+          <p:cNvSpPr>
+            <a:spLocks noGrp="1" noRot="1" noChangeAspect="1" noMove="1" noResize="1" noEditPoints="1" noAdjustHandles="1" noChangeArrowheads="1" noChangeShapeType="1" noTextEdit="1"/>
+          </p:cNvSpPr>
+          <p:nvPr>
+            <p:extLst>
+              <p:ext uri="{386F3935-93C4-4BCD-93E2-E3B085C9AB24}">
+                <p16:designElem xmlns:p16="http://schemas.microsoft.com/office/powerpoint/2015/main" val="1"/>
+              </p:ext>
+            </p:extLst>
+          </p:nvPr>
+        </p:nvSpPr>
+        <p:spPr>
+          <a:xfrm>
+            <a:off x="0" y="0"/>
+            <a:ext cx="12192000" cy="6858000"/>
+          </a:xfrm>
+          <a:prstGeom prst="rect">
+            <a:avLst/>
+          </a:prstGeom>
+          <a:ln>
+            <a:noFill/>
+          </a:ln>
+        </p:spPr>
+        <p:style>
+          <a:lnRef idx="2">
+            <a:schemeClr val="accent1">
+              <a:shade val="50000"/>
+            </a:schemeClr>
+          </a:lnRef>
+          <a:fillRef idx="1">
+            <a:schemeClr val="accent1"/>
+          </a:fillRef>
+          <a:effectRef idx="0">
+            <a:schemeClr val="accent1"/>
+          </a:effectRef>
+          <a:fontRef idx="minor">
+            <a:schemeClr val="lt1"/>
+          </a:fontRef>
+        </p:style>
+        <p:txBody>
+          <a:bodyPr rtlCol="0" anchor="ctr"/>
+          <a:lstStyle/>
+          <a:p>
+            <a:pPr algn="ctr"/>
+            <a:endParaRPr lang="en-US"/>
+          </a:p>
+        </p:txBody>
+      </p:sp>
       <p:sp>
         <p:nvSpPr>
           <p:cNvPr id="2" name="Title 1">
@@ -4576,13 +4857,20 @@
             <p:ph type="title"/>
           </p:nvPr>
         </p:nvSpPr>
-        <p:spPr/>
-        <p:txBody>
-          <a:bodyPr/>
-          <a:lstStyle/>
-          <a:p>
-            <a:r>
-              <a:rPr lang="en-PH" dirty="0"/>
+        <p:spPr>
+          <a:xfrm>
+            <a:off x="630936" y="639520"/>
+            <a:ext cx="3429000" cy="1719072"/>
+          </a:xfrm>
+        </p:spPr>
+        <p:txBody>
+          <a:bodyPr anchor="b">
+            <a:normAutofit/>
+          </a:bodyPr>
+          <a:lstStyle/>
+          <a:p>
+            <a:r>
+              <a:rPr lang="en-PH" sz="5400"/>
               <a:t>Application</a:t>
             </a:r>
           </a:p>
@@ -4590,6 +4878,279 @@
       </p:sp>
       <p:sp>
         <p:nvSpPr>
+          <p:cNvPr id="12" name="sketch line">
+            <a:extLst>
+              <a:ext uri="{FF2B5EF4-FFF2-40B4-BE49-F238E27FC236}">
+                <a16:creationId xmlns:a16="http://schemas.microsoft.com/office/drawing/2014/main" id="{CD8B4F24-440B-49E9-B85D-733523DC064B}"/>
+              </a:ext>
+              <a:ext uri="{C183D7F6-B498-43B3-948B-1728B52AA6E4}">
+                <adec:decorative xmlns:adec="http://schemas.microsoft.com/office/drawing/2017/decorative" val="1"/>
+              </a:ext>
+            </a:extLst>
+          </p:cNvPr>
+          <p:cNvSpPr>
+            <a:spLocks noGrp="1" noRot="1" noChangeAspect="1" noMove="1" noResize="1" noEditPoints="1" noAdjustHandles="1" noChangeArrowheads="1" noChangeShapeType="1" noTextEdit="1"/>
+          </p:cNvSpPr>
+          <p:nvPr>
+            <p:extLst>
+              <p:ext uri="{386F3935-93C4-4BCD-93E2-E3B085C9AB24}">
+                <p16:designElem xmlns:p16="http://schemas.microsoft.com/office/powerpoint/2015/main" val="1"/>
+              </p:ext>
+            </p:extLst>
+          </p:nvPr>
+        </p:nvSpPr>
+        <p:spPr>
+          <a:xfrm>
+            <a:off x="643278" y="2573756"/>
+            <a:ext cx="3255095" cy="18288"/>
+          </a:xfrm>
+          <a:custGeom>
+            <a:avLst/>
+            <a:gdLst>
+              <a:gd name="connsiteX0" fmla="*/ 0 w 3255095"/>
+              <a:gd name="connsiteY0" fmla="*/ 0 h 18288"/>
+              <a:gd name="connsiteX1" fmla="*/ 618468 w 3255095"/>
+              <a:gd name="connsiteY1" fmla="*/ 0 h 18288"/>
+              <a:gd name="connsiteX2" fmla="*/ 1269487 w 3255095"/>
+              <a:gd name="connsiteY2" fmla="*/ 0 h 18288"/>
+              <a:gd name="connsiteX3" fmla="*/ 1953057 w 3255095"/>
+              <a:gd name="connsiteY3" fmla="*/ 0 h 18288"/>
+              <a:gd name="connsiteX4" fmla="*/ 2636627 w 3255095"/>
+              <a:gd name="connsiteY4" fmla="*/ 0 h 18288"/>
+              <a:gd name="connsiteX5" fmla="*/ 3255095 w 3255095"/>
+              <a:gd name="connsiteY5" fmla="*/ 0 h 18288"/>
+              <a:gd name="connsiteX6" fmla="*/ 3255095 w 3255095"/>
+              <a:gd name="connsiteY6" fmla="*/ 18288 h 18288"/>
+              <a:gd name="connsiteX7" fmla="*/ 2538974 w 3255095"/>
+              <a:gd name="connsiteY7" fmla="*/ 18288 h 18288"/>
+              <a:gd name="connsiteX8" fmla="*/ 1822853 w 3255095"/>
+              <a:gd name="connsiteY8" fmla="*/ 18288 h 18288"/>
+              <a:gd name="connsiteX9" fmla="*/ 1171834 w 3255095"/>
+              <a:gd name="connsiteY9" fmla="*/ 18288 h 18288"/>
+              <a:gd name="connsiteX10" fmla="*/ 0 w 3255095"/>
+              <a:gd name="connsiteY10" fmla="*/ 18288 h 18288"/>
+              <a:gd name="connsiteX11" fmla="*/ 0 w 3255095"/>
+              <a:gd name="connsiteY11" fmla="*/ 0 h 18288"/>
+            </a:gdLst>
+            <a:ahLst/>
+            <a:cxnLst>
+              <a:cxn ang="0">
+                <a:pos x="connsiteX0" y="connsiteY0"/>
+              </a:cxn>
+              <a:cxn ang="0">
+                <a:pos x="connsiteX1" y="connsiteY1"/>
+              </a:cxn>
+              <a:cxn ang="0">
+                <a:pos x="connsiteX2" y="connsiteY2"/>
+              </a:cxn>
+              <a:cxn ang="0">
+                <a:pos x="connsiteX3" y="connsiteY3"/>
+              </a:cxn>
+              <a:cxn ang="0">
+                <a:pos x="connsiteX4" y="connsiteY4"/>
+              </a:cxn>
+              <a:cxn ang="0">
+                <a:pos x="connsiteX5" y="connsiteY5"/>
+              </a:cxn>
+              <a:cxn ang="0">
+                <a:pos x="connsiteX6" y="connsiteY6"/>
+              </a:cxn>
+              <a:cxn ang="0">
+                <a:pos x="connsiteX7" y="connsiteY7"/>
+              </a:cxn>
+              <a:cxn ang="0">
+                <a:pos x="connsiteX8" y="connsiteY8"/>
+              </a:cxn>
+              <a:cxn ang="0">
+                <a:pos x="connsiteX9" y="connsiteY9"/>
+              </a:cxn>
+              <a:cxn ang="0">
+                <a:pos x="connsiteX10" y="connsiteY10"/>
+              </a:cxn>
+              <a:cxn ang="0">
+                <a:pos x="connsiteX11" y="connsiteY11"/>
+              </a:cxn>
+            </a:cxnLst>
+            <a:rect l="l" t="t" r="r" b="b"/>
+            <a:pathLst>
+              <a:path w="3255095" h="18288" fill="none" extrusionOk="0">
+                <a:moveTo>
+                  <a:pt x="0" y="0"/>
+                </a:moveTo>
+                <a:cubicBezTo>
+                  <a:pt x="240201" y="-22123"/>
+                  <a:pt x="462021" y="-19623"/>
+                  <a:pt x="618468" y="0"/>
+                </a:cubicBezTo>
+                <a:cubicBezTo>
+                  <a:pt x="774915" y="19623"/>
+                  <a:pt x="974734" y="2035"/>
+                  <a:pt x="1269487" y="0"/>
+                </a:cubicBezTo>
+                <a:cubicBezTo>
+                  <a:pt x="1564240" y="-2035"/>
+                  <a:pt x="1733579" y="10639"/>
+                  <a:pt x="1953057" y="0"/>
+                </a:cubicBezTo>
+                <a:cubicBezTo>
+                  <a:pt x="2172535" y="-10639"/>
+                  <a:pt x="2453962" y="14018"/>
+                  <a:pt x="2636627" y="0"/>
+                </a:cubicBezTo>
+                <a:cubicBezTo>
+                  <a:pt x="2819292" y="-14018"/>
+                  <a:pt x="3121375" y="5399"/>
+                  <a:pt x="3255095" y="0"/>
+                </a:cubicBezTo>
+                <a:cubicBezTo>
+                  <a:pt x="3254386" y="8157"/>
+                  <a:pt x="3254682" y="12125"/>
+                  <a:pt x="3255095" y="18288"/>
+                </a:cubicBezTo>
+                <a:cubicBezTo>
+                  <a:pt x="3088545" y="23203"/>
+                  <a:pt x="2687475" y="7419"/>
+                  <a:pt x="2538974" y="18288"/>
+                </a:cubicBezTo>
+                <a:cubicBezTo>
+                  <a:pt x="2390473" y="29157"/>
+                  <a:pt x="2137381" y="-8959"/>
+                  <a:pt x="1822853" y="18288"/>
+                </a:cubicBezTo>
+                <a:cubicBezTo>
+                  <a:pt x="1508325" y="45535"/>
+                  <a:pt x="1466437" y="20385"/>
+                  <a:pt x="1171834" y="18288"/>
+                </a:cubicBezTo>
+                <a:cubicBezTo>
+                  <a:pt x="877231" y="16191"/>
+                  <a:pt x="561097" y="37643"/>
+                  <a:pt x="0" y="18288"/>
+                </a:cubicBezTo>
+                <a:cubicBezTo>
+                  <a:pt x="-46" y="12483"/>
+                  <a:pt x="-203" y="6491"/>
+                  <a:pt x="0" y="0"/>
+                </a:cubicBezTo>
+                <a:close/>
+              </a:path>
+              <a:path w="3255095" h="18288" stroke="0" extrusionOk="0">
+                <a:moveTo>
+                  <a:pt x="0" y="0"/>
+                </a:moveTo>
+                <a:cubicBezTo>
+                  <a:pt x="291965" y="19429"/>
+                  <a:pt x="363155" y="8568"/>
+                  <a:pt x="618468" y="0"/>
+                </a:cubicBezTo>
+                <a:cubicBezTo>
+                  <a:pt x="873781" y="-8568"/>
+                  <a:pt x="904459" y="-19505"/>
+                  <a:pt x="1171834" y="0"/>
+                </a:cubicBezTo>
+                <a:cubicBezTo>
+                  <a:pt x="1439209" y="19505"/>
+                  <a:pt x="1744369" y="9790"/>
+                  <a:pt x="1887955" y="0"/>
+                </a:cubicBezTo>
+                <a:cubicBezTo>
+                  <a:pt x="2031541" y="-9790"/>
+                  <a:pt x="2346378" y="21240"/>
+                  <a:pt x="2506423" y="0"/>
+                </a:cubicBezTo>
+                <a:cubicBezTo>
+                  <a:pt x="2666468" y="-21240"/>
+                  <a:pt x="2990257" y="30414"/>
+                  <a:pt x="3255095" y="0"/>
+                </a:cubicBezTo>
+                <a:cubicBezTo>
+                  <a:pt x="3254831" y="4493"/>
+                  <a:pt x="3255479" y="9472"/>
+                  <a:pt x="3255095" y="18288"/>
+                </a:cubicBezTo>
+                <a:cubicBezTo>
+                  <a:pt x="3120743" y="16690"/>
+                  <a:pt x="2759628" y="42462"/>
+                  <a:pt x="2604076" y="18288"/>
+                </a:cubicBezTo>
+                <a:cubicBezTo>
+                  <a:pt x="2448524" y="-5886"/>
+                  <a:pt x="2184336" y="19599"/>
+                  <a:pt x="1887955" y="18288"/>
+                </a:cubicBezTo>
+                <a:cubicBezTo>
+                  <a:pt x="1591574" y="16977"/>
+                  <a:pt x="1548845" y="6870"/>
+                  <a:pt x="1334589" y="18288"/>
+                </a:cubicBezTo>
+                <a:cubicBezTo>
+                  <a:pt x="1120333" y="29706"/>
+                  <a:pt x="996014" y="9662"/>
+                  <a:pt x="683570" y="18288"/>
+                </a:cubicBezTo>
+                <a:cubicBezTo>
+                  <a:pt x="371126" y="26914"/>
+                  <a:pt x="198687" y="16167"/>
+                  <a:pt x="0" y="18288"/>
+                </a:cubicBezTo>
+                <a:cubicBezTo>
+                  <a:pt x="843" y="9577"/>
+                  <a:pt x="371" y="6900"/>
+                  <a:pt x="0" y="0"/>
+                </a:cubicBezTo>
+                <a:close/>
+              </a:path>
+            </a:pathLst>
+          </a:custGeom>
+          <a:solidFill>
+            <a:schemeClr val="accent2"/>
+          </a:solidFill>
+          <a:ln w="38100" cap="rnd">
+            <a:solidFill>
+              <a:schemeClr val="accent2"/>
+            </a:solidFill>
+            <a:round/>
+            <a:extLst>
+              <a:ext uri="{C807C97D-BFC1-408E-A445-0C87EB9F89A2}">
+                <ask:lineSketchStyleProps xmlns:ask="http://schemas.microsoft.com/office/drawing/2018/sketchyshapes" sd="1219033472">
+                  <a:prstGeom prst="rect">
+                    <a:avLst/>
+                  </a:prstGeom>
+                  <ask:type>
+                    <ask:lineSketchFreehand/>
+                  </ask:type>
+                </ask:lineSketchStyleProps>
+              </a:ext>
+            </a:extLst>
+          </a:ln>
+        </p:spPr>
+        <p:style>
+          <a:lnRef idx="2">
+            <a:schemeClr val="accent1">
+              <a:shade val="50000"/>
+            </a:schemeClr>
+          </a:lnRef>
+          <a:fillRef idx="1">
+            <a:schemeClr val="accent1"/>
+          </a:fillRef>
+          <a:effectRef idx="0">
+            <a:schemeClr val="accent1"/>
+          </a:effectRef>
+          <a:fontRef idx="minor">
+            <a:schemeClr val="lt1"/>
+          </a:fontRef>
+        </p:style>
+        <p:txBody>
+          <a:bodyPr rtlCol="0" anchor="ctr"/>
+          <a:lstStyle/>
+          <a:p>
+            <a:pPr algn="ctr"/>
+            <a:endParaRPr lang="en-US"/>
+          </a:p>
+        </p:txBody>
+      </p:sp>
+      <p:sp>
+        <p:nvSpPr>
           <p:cNvPr id="3" name="Content Placeholder 2">
             <a:extLst>
               <a:ext uri="{FF2B5EF4-FFF2-40B4-BE49-F238E27FC236}">
@@ -4604,29 +5165,106 @@
             <p:ph idx="1"/>
           </p:nvPr>
         </p:nvSpPr>
-        <p:spPr/>
-        <p:txBody>
-          <a:bodyPr/>
-          <a:lstStyle/>
-          <a:p>
-            <a:r>
-              <a:rPr lang="en-PH" dirty="0"/>
+        <p:spPr>
+          <a:xfrm>
+            <a:off x="630936" y="2807208"/>
+            <a:ext cx="3895988" cy="3410712"/>
+          </a:xfrm>
+        </p:spPr>
+        <p:txBody>
+          <a:bodyPr anchor="t">
+            <a:normAutofit/>
+          </a:bodyPr>
+          <a:lstStyle/>
+          <a:p>
+            <a:r>
+              <a:rPr lang="en-PH" sz="2200" dirty="0"/>
               <a:t>Uses </a:t>
             </a:r>
             <a:r>
-              <a:rPr lang="en-PH" dirty="0" err="1"/>
+              <a:rPr lang="en-PH" sz="2200" dirty="0" err="1"/>
               <a:t>streamlit</a:t>
             </a:r>
             <a:r>
-              <a:rPr lang="en-PH" dirty="0"/>
-              <a:t> frontend</a:t>
-            </a:r>
-          </a:p>
-          <a:p>
-            <a:endParaRPr lang="en-PH" dirty="0"/>
-          </a:p>
-        </p:txBody>
-      </p:sp>
+              <a:rPr lang="en-PH" sz="2200" dirty="0"/>
+              <a:t> for client frontend</a:t>
+            </a:r>
+          </a:p>
+          <a:p>
+            <a:r>
+              <a:rPr lang="en-PH" sz="2200" dirty="0"/>
+              <a:t>Supports local inference and server-side inference (with server script to process images)</a:t>
+            </a:r>
+          </a:p>
+          <a:p>
+            <a:r>
+              <a:rPr lang="en-PH" sz="2200" dirty="0"/>
+              <a:t>Can select one or more specific class to segment</a:t>
+            </a:r>
+          </a:p>
+          <a:p>
+            <a:endParaRPr lang="en-PH" sz="2200" dirty="0"/>
+          </a:p>
+        </p:txBody>
+      </p:sp>
+      <p:pic>
+        <p:nvPicPr>
+          <p:cNvPr id="5" name="Picture 4" descr="A screenshot of a computer&#10;&#10;Description automatically generated">
+            <a:extLst>
+              <a:ext uri="{FF2B5EF4-FFF2-40B4-BE49-F238E27FC236}">
+                <a16:creationId xmlns:a16="http://schemas.microsoft.com/office/drawing/2014/main" id="{F91B1BC8-84F9-3277-E5BA-0C362B383C4A}"/>
+              </a:ext>
+            </a:extLst>
+          </p:cNvPr>
+          <p:cNvPicPr>
+            <a:picLocks noChangeAspect="1"/>
+          </p:cNvPicPr>
+          <p:nvPr/>
+        </p:nvPicPr>
+        <p:blipFill>
+          <a:blip r:embed="rId2"/>
+          <a:srcRect b="16363"/>
+          <a:stretch/>
+        </p:blipFill>
+        <p:spPr>
+          <a:xfrm>
+            <a:off x="4690872" y="508408"/>
+            <a:ext cx="6903720" cy="3348977"/>
+          </a:xfrm>
+          <a:prstGeom prst="rect">
+            <a:avLst/>
+          </a:prstGeom>
+        </p:spPr>
+      </p:pic>
+      <p:pic>
+        <p:nvPicPr>
+          <p:cNvPr id="9" name="Picture 8">
+            <a:extLst>
+              <a:ext uri="{FF2B5EF4-FFF2-40B4-BE49-F238E27FC236}">
+                <a16:creationId xmlns:a16="http://schemas.microsoft.com/office/drawing/2014/main" id="{B80032D4-C757-605F-94FF-AD49B4E03057}"/>
+              </a:ext>
+            </a:extLst>
+          </p:cNvPr>
+          <p:cNvPicPr>
+            <a:picLocks noChangeAspect="1"/>
+          </p:cNvPicPr>
+          <p:nvPr/>
+        </p:nvPicPr>
+        <p:blipFill>
+          <a:blip r:embed="rId3"/>
+          <a:srcRect t="15489" b="32497"/>
+          <a:stretch/>
+        </p:blipFill>
+        <p:spPr>
+          <a:xfrm>
+            <a:off x="4784329" y="4172430"/>
+            <a:ext cx="6810264" cy="1790380"/>
+          </a:xfrm>
+          <a:prstGeom prst="rect">
+            <a:avLst/>
+          </a:prstGeom>
+        </p:spPr>
+      </p:pic>
     </p:spTree>
     <p:extLst>
       <p:ext uri="{BB962C8B-B14F-4D97-AF65-F5344CB8AC3E}">

</xml_diff>